<commit_message>
Route Locator from properties
</commit_message>
<xml_diff>
--- a/Netflix_au_service_du_printemps.pptx
+++ b/Netflix_au_service_du_printemps.pptx
@@ -333,7 +333,7 @@
           <a:p>
             <a:fld id="{5BCAD085-E8A6-8845-BD4E-CB4CCA059FC4}" type="datetimeFigureOut">
               <a:rPr lang="en-US" smtClean="0"/>
-              <a:t>9/15/2024</a:t>
+              <a:t>10/11/2024</a:t>
             </a:fld>
             <a:endParaRPr lang="en-US"/>
           </a:p>
@@ -501,7 +501,7 @@
           <a:p>
             <a:fld id="{5BCAD085-E8A6-8845-BD4E-CB4CCA059FC4}" type="datetimeFigureOut">
               <a:rPr lang="en-US" smtClean="0"/>
-              <a:t>9/15/2024</a:t>
+              <a:t>10/11/2024</a:t>
             </a:fld>
             <a:endParaRPr lang="en-US"/>
           </a:p>
@@ -679,7 +679,7 @@
           <a:p>
             <a:fld id="{5BCAD085-E8A6-8845-BD4E-CB4CCA059FC4}" type="datetimeFigureOut">
               <a:rPr lang="en-US" smtClean="0"/>
-              <a:t>9/15/2024</a:t>
+              <a:t>10/11/2024</a:t>
             </a:fld>
             <a:endParaRPr lang="en-US"/>
           </a:p>
@@ -847,7 +847,7 @@
           <a:p>
             <a:fld id="{5BCAD085-E8A6-8845-BD4E-CB4CCA059FC4}" type="datetimeFigureOut">
               <a:rPr lang="en-US" smtClean="0"/>
-              <a:t>9/15/2024</a:t>
+              <a:t>10/11/2024</a:t>
             </a:fld>
             <a:endParaRPr lang="en-US"/>
           </a:p>
@@ -1092,7 +1092,7 @@
           <a:p>
             <a:fld id="{5BCAD085-E8A6-8845-BD4E-CB4CCA059FC4}" type="datetimeFigureOut">
               <a:rPr lang="en-US" smtClean="0"/>
-              <a:t>9/15/2024</a:t>
+              <a:t>10/11/2024</a:t>
             </a:fld>
             <a:endParaRPr lang="en-US"/>
           </a:p>
@@ -1377,7 +1377,7 @@
           <a:p>
             <a:fld id="{5BCAD085-E8A6-8845-BD4E-CB4CCA059FC4}" type="datetimeFigureOut">
               <a:rPr lang="en-US" smtClean="0"/>
-              <a:t>9/15/2024</a:t>
+              <a:t>10/11/2024</a:t>
             </a:fld>
             <a:endParaRPr lang="en-US"/>
           </a:p>
@@ -1796,7 +1796,7 @@
           <a:p>
             <a:fld id="{5BCAD085-E8A6-8845-BD4E-CB4CCA059FC4}" type="datetimeFigureOut">
               <a:rPr lang="en-US" smtClean="0"/>
-              <a:t>9/15/2024</a:t>
+              <a:t>10/11/2024</a:t>
             </a:fld>
             <a:endParaRPr lang="en-US"/>
           </a:p>
@@ -1913,7 +1913,7 @@
           <a:p>
             <a:fld id="{5BCAD085-E8A6-8845-BD4E-CB4CCA059FC4}" type="datetimeFigureOut">
               <a:rPr lang="en-US" smtClean="0"/>
-              <a:t>9/15/2024</a:t>
+              <a:t>10/11/2024</a:t>
             </a:fld>
             <a:endParaRPr lang="en-US"/>
           </a:p>
@@ -2008,7 +2008,7 @@
           <a:p>
             <a:fld id="{5BCAD085-E8A6-8845-BD4E-CB4CCA059FC4}" type="datetimeFigureOut">
               <a:rPr lang="en-US" smtClean="0"/>
-              <a:t>9/15/2024</a:t>
+              <a:t>10/11/2024</a:t>
             </a:fld>
             <a:endParaRPr lang="en-US"/>
           </a:p>
@@ -2283,7 +2283,7 @@
           <a:p>
             <a:fld id="{5BCAD085-E8A6-8845-BD4E-CB4CCA059FC4}" type="datetimeFigureOut">
               <a:rPr lang="en-US" smtClean="0"/>
-              <a:t>9/15/2024</a:t>
+              <a:t>10/11/2024</a:t>
             </a:fld>
             <a:endParaRPr lang="en-US"/>
           </a:p>
@@ -2535,7 +2535,7 @@
           <a:p>
             <a:fld id="{5BCAD085-E8A6-8845-BD4E-CB4CCA059FC4}" type="datetimeFigureOut">
               <a:rPr lang="en-US" smtClean="0"/>
-              <a:t>9/15/2024</a:t>
+              <a:t>10/11/2024</a:t>
             </a:fld>
             <a:endParaRPr lang="en-US"/>
           </a:p>
@@ -2746,7 +2746,7 @@
           <a:p>
             <a:fld id="{5BCAD085-E8A6-8845-BD4E-CB4CCA059FC4}" type="datetimeFigureOut">
               <a:rPr lang="en-US" smtClean="0"/>
-              <a:t>9/15/2024</a:t>
+              <a:t>10/11/2024</a:t>
             </a:fld>
             <a:endParaRPr lang="en-US"/>
           </a:p>
@@ -3696,7 +3696,7 @@
         <p:spPr/>
         <p:txBody>
           <a:bodyPr>
-            <a:normAutofit fontScale="85000" lnSpcReduction="10000"/>
+            <a:normAutofit fontScale="70000" lnSpcReduction="20000"/>
           </a:bodyPr>
           <a:lstStyle/>
           <a:p>
@@ -3776,6 +3776,62 @@
               <a:buNone/>
             </a:pPr>
             <a:r>
+              <a:rPr lang="fr-FR" b="0" i="0" dirty="0">
+                <a:solidFill>
+                  <a:srgbClr val="FFC000"/>
+                </a:solidFill>
+                <a:effectLst/>
+                <a:latin typeface="-apple-system"/>
+              </a:rPr>
+              <a:t>Appuyer le archi IT dynamique et hautement </a:t>
+            </a:r>
+            <a:r>
+              <a:rPr lang="fr-FR" b="0" i="0" dirty="0" err="1">
+                <a:solidFill>
+                  <a:srgbClr val="FFC000"/>
+                </a:solidFill>
+                <a:effectLst/>
+                <a:latin typeface="-apple-system"/>
+              </a:rPr>
+              <a:t>evolutive</a:t>
+            </a:r>
+            <a:endParaRPr lang="fr-FR" b="0" i="0" dirty="0">
+              <a:solidFill>
+                <a:srgbClr val="FFC000"/>
+              </a:solidFill>
+              <a:effectLst/>
+              <a:latin typeface="-apple-system"/>
+            </a:endParaRPr>
+          </a:p>
+          <a:p>
+            <a:pPr marL="0" indent="0" algn="l" fontAlgn="auto">
+              <a:buNone/>
+            </a:pPr>
+            <a:r>
+              <a:rPr lang="fr-FR" b="0" i="0" dirty="0">
+                <a:solidFill>
+                  <a:srgbClr val="FFC000"/>
+                </a:solidFill>
+                <a:effectLst/>
+                <a:latin typeface="-apple-system"/>
+              </a:rPr>
+              <a:t>Avec conviction.</a:t>
+            </a:r>
+          </a:p>
+          <a:p>
+            <a:pPr marL="0" indent="0" algn="l" fontAlgn="auto">
+              <a:buNone/>
+            </a:pPr>
+            <a:endParaRPr lang="fr-FR" b="0" i="0" dirty="0">
+              <a:effectLst/>
+              <a:latin typeface="-apple-system"/>
+            </a:endParaRPr>
+          </a:p>
+          <a:p>
+            <a:pPr marL="0" indent="0" algn="l" fontAlgn="auto">
+              <a:buNone/>
+            </a:pPr>
+            <a:r>
               <a:rPr lang="fr-FR" dirty="0">
                 <a:latin typeface="-apple-system"/>
               </a:rPr>
@@ -3786,7 +3842,7 @@
                 <a:effectLst/>
                 <a:latin typeface="-apple-system"/>
               </a:rPr>
-              <a:t>, facilite le développement, le déploiement et la gestion des microservices, Permettant aux entreprises d’avoir des applications modernes, résilientes et évolutives.</a:t>
+              <a:t>, facilite le développement, le déploiement et la gestion des microservices, permettant aux entreprises d’avoir des applications modernes, résilientes et évolutives.</a:t>
             </a:r>
             <a:r>
               <a:rPr lang="fr-FR" b="0" i="0" dirty="0">
@@ -11440,7 +11496,7 @@
         <p:spPr/>
         <p:txBody>
           <a:bodyPr>
-            <a:normAutofit fontScale="40000" lnSpcReduction="20000"/>
+            <a:normAutofit fontScale="32500" lnSpcReduction="20000"/>
           </a:bodyPr>
           <a:lstStyle/>
           <a:p>
@@ -11642,7 +11698,7 @@
                 <a:effectLst/>
                 <a:latin typeface="-apple-system"/>
               </a:rPr>
-              <a:t>st le service de découverte qui permet aux microservices de s’identifier et de communiquer 	entre eux. </a:t>
+              <a:t>st le service de découverte qui permet aux microservices de s’identifier et de communiquer entre eux. </a:t>
             </a:r>
           </a:p>
           <a:p>
@@ -11717,7 +11773,7 @@
             </a:pPr>
             <a:r>
               <a:rPr lang="fr-FR" sz="4000" dirty="0"/>
-              <a:t>Ouverture vers des optimisations futures : </a:t>
+              <a:t>Ouverture vers des optimisations futures : Hystrix Dashboard </a:t>
             </a:r>
             <a:r>
               <a:rPr lang="fr-FR" sz="4000" dirty="0" err="1"/>
@@ -12410,7 +12466,7 @@
           <p:nvPr>
             <p:extLst>
               <p:ext uri="{D42A27DB-BD31-4B8C-83A1-F6EECF244321}">
-                <p14:modId xmlns:p14="http://schemas.microsoft.com/office/powerpoint/2010/main" val="1733468521"/>
+                <p14:modId xmlns:p14="http://schemas.microsoft.com/office/powerpoint/2010/main" val="609617799"/>
               </p:ext>
             </p:extLst>
           </p:nvPr>
@@ -12467,7 +12523,7 @@
                       <a:pPr algn="ctr"/>
                       <a:r>
                         <a:rPr lang="fr-CH" dirty="0"/>
-                        <a:t>Avant</a:t>
+                        <a:t>Statique</a:t>
                       </a:r>
                       <a:endParaRPr lang="fr-FR" dirty="0"/>
                     </a:p>
@@ -12482,7 +12538,7 @@
                       <a:pPr algn="ctr"/>
                       <a:r>
                         <a:rPr lang="fr-CH" dirty="0"/>
-                        <a:t>Après</a:t>
+                        <a:t>Dynamique</a:t>
                       </a:r>
                       <a:endParaRPr lang="fr-FR" dirty="0"/>
                     </a:p>
@@ -13084,18 +13140,26 @@
                         <a:defRPr/>
                       </a:pPr>
                       <a:r>
-                        <a:rPr lang="fr-CH" sz="1200" dirty="0"/>
+                        <a:rPr lang="fr-CH" sz="1200" dirty="0">
+                          <a:solidFill>
+                            <a:srgbClr val="C00000"/>
+                          </a:solidFill>
+                        </a:rPr>
                         <a:t>Une seule base de connaissance, assurant la cohérence des données </a:t>
                       </a:r>
                       <a:r>
                         <a:rPr lang="fr-CH" sz="1200" b="1" dirty="0">
                           <a:solidFill>
-                            <a:srgbClr val="00B050"/>
+                            <a:srgbClr val="C00000"/>
                           </a:solidFill>
                         </a:rPr>
                         <a:t>(+)</a:t>
                       </a:r>
-                      <a:endParaRPr lang="fr-CH" sz="1200" dirty="0"/>
+                      <a:endParaRPr lang="fr-CH" sz="1200" dirty="0">
+                        <a:solidFill>
+                          <a:srgbClr val="C00000"/>
+                        </a:solidFill>
+                      </a:endParaRPr>
                     </a:p>
                     <a:p>
                       <a:pPr marL="285750" marR="0" lvl="0" indent="-285750" algn="l" defTabSz="457200" rtl="0" eaLnBrk="1" fontAlgn="auto" latinLnBrk="0" hangingPunct="1">
@@ -13116,18 +13180,26 @@
                         <a:defRPr/>
                       </a:pPr>
                       <a:r>
-                        <a:rPr lang="fr-CH" sz="1200" dirty="0"/>
+                        <a:rPr lang="fr-CH" sz="1200" dirty="0">
+                          <a:solidFill>
+                            <a:srgbClr val="C00000"/>
+                          </a:solidFill>
+                        </a:rPr>
                         <a:t>Base de données plus sollicitées, donc moins performantes</a:t>
                       </a:r>
                       <a:r>
                         <a:rPr lang="fr-CH" sz="1200" b="1" dirty="0">
                           <a:solidFill>
-                            <a:srgbClr val="FF0000"/>
+                            <a:srgbClr val="C00000"/>
                           </a:solidFill>
                         </a:rPr>
                         <a:t> (-)</a:t>
                       </a:r>
-                      <a:endParaRPr lang="fr-CH" sz="1200" dirty="0"/>
+                      <a:endParaRPr lang="fr-CH" sz="1200" dirty="0">
+                        <a:solidFill>
+                          <a:srgbClr val="C00000"/>
+                        </a:solidFill>
+                      </a:endParaRPr>
                     </a:p>
                     <a:p>
                       <a:pPr marL="285750" marR="0" lvl="0" indent="-285750" algn="l" defTabSz="457200" rtl="0" eaLnBrk="1" fontAlgn="auto" latinLnBrk="0" hangingPunct="1">
@@ -13148,18 +13220,26 @@
                         <a:defRPr/>
                       </a:pPr>
                       <a:r>
-                        <a:rPr lang="fr-CH" sz="1200" dirty="0"/>
+                        <a:rPr lang="fr-CH" sz="1200" dirty="0">
+                          <a:solidFill>
+                            <a:srgbClr val="C00000"/>
+                          </a:solidFill>
+                        </a:rPr>
                         <a:t>Montée de version ou  changement de produit plus difficile </a:t>
                       </a:r>
                       <a:r>
                         <a:rPr lang="fr-CH" sz="1200" b="1" dirty="0">
                           <a:solidFill>
-                            <a:srgbClr val="FF0000"/>
+                            <a:srgbClr val="C00000"/>
                           </a:solidFill>
                         </a:rPr>
                         <a:t>(-)</a:t>
                       </a:r>
-                      <a:endParaRPr lang="fr-FR" sz="1200" dirty="0"/>
+                      <a:endParaRPr lang="fr-FR" sz="1200" dirty="0">
+                        <a:solidFill>
+                          <a:srgbClr val="C00000"/>
+                        </a:solidFill>
+                      </a:endParaRPr>
                     </a:p>
                   </a:txBody>
                   <a:tcPr/>
@@ -13188,6 +13268,9 @@
                       </a:pPr>
                       <a:r>
                         <a:rPr lang="fr-FR" sz="1200" b="0" i="0" dirty="0">
+                          <a:solidFill>
+                            <a:srgbClr val="C00000"/>
+                          </a:solidFill>
                           <a:effectLst/>
                           <a:latin typeface="-apple-system"/>
                         </a:rPr>
@@ -13195,6 +13278,9 @@
                       </a:r>
                       <a:r>
                         <a:rPr lang="fr-FR" sz="1200" b="0" i="0" dirty="0" err="1">
+                          <a:solidFill>
+                            <a:srgbClr val="C00000"/>
+                          </a:solidFill>
                           <a:effectLst/>
                           <a:latin typeface="-apple-system"/>
                         </a:rPr>
@@ -13202,6 +13288,9 @@
                       </a:r>
                       <a:r>
                         <a:rPr lang="fr-FR" sz="1200" b="0" i="0" dirty="0">
+                          <a:solidFill>
+                            <a:srgbClr val="C00000"/>
+                          </a:solidFill>
                           <a:effectLst/>
                           <a:latin typeface="-apple-system"/>
                         </a:rPr>
@@ -13210,12 +13299,15 @@
                       <a:r>
                         <a:rPr lang="fr-CH" sz="1200" b="1" dirty="0">
                           <a:solidFill>
-                            <a:srgbClr val="00B050"/>
+                            <a:srgbClr val="C00000"/>
                           </a:solidFill>
                         </a:rPr>
                         <a:t>(+)</a:t>
                       </a:r>
                       <a:endParaRPr lang="fr-FR" sz="1200" b="0" i="0" dirty="0">
+                        <a:solidFill>
+                          <a:srgbClr val="C00000"/>
+                        </a:solidFill>
                         <a:effectLst/>
                         <a:latin typeface="-apple-system"/>
                       </a:endParaRPr>
@@ -13240,6 +13332,9 @@
                       </a:pPr>
                       <a:r>
                         <a:rPr lang="fr-FR" sz="1200" b="0" i="0" dirty="0">
+                          <a:solidFill>
+                            <a:srgbClr val="C00000"/>
+                          </a:solidFill>
                           <a:effectLst/>
                           <a:latin typeface="-apple-system"/>
                         </a:rPr>
@@ -13248,12 +13343,15 @@
                       <a:r>
                         <a:rPr lang="fr-CH" sz="1200" b="1" dirty="0">
                           <a:solidFill>
-                            <a:srgbClr val="00B050"/>
+                            <a:srgbClr val="C00000"/>
                           </a:solidFill>
                         </a:rPr>
                         <a:t>(+)</a:t>
                       </a:r>
                       <a:endParaRPr lang="fr-FR" sz="1200" b="0" i="0" dirty="0">
+                        <a:solidFill>
+                          <a:srgbClr val="C00000"/>
+                        </a:solidFill>
                         <a:effectLst/>
                         <a:latin typeface="-apple-system"/>
                       </a:endParaRPr>
@@ -13278,6 +13376,9 @@
                       </a:pPr>
                       <a:r>
                         <a:rPr lang="fr-FR" sz="1200" b="0" i="0" dirty="0">
+                          <a:solidFill>
+                            <a:srgbClr val="C00000"/>
+                          </a:solidFill>
                           <a:effectLst/>
                           <a:latin typeface="-apple-system"/>
                         </a:rPr>
@@ -13286,12 +13387,16 @@
                       <a:r>
                         <a:rPr lang="fr-CH" sz="1200" b="1" dirty="0">
                           <a:solidFill>
-                            <a:srgbClr val="FF0000"/>
+                            <a:srgbClr val="C00000"/>
                           </a:solidFill>
                         </a:rPr>
                         <a:t>(-)</a:t>
                       </a:r>
-                      <a:endParaRPr lang="fr-FR" sz="1200" dirty="0"/>
+                      <a:endParaRPr lang="fr-FR" sz="1200" dirty="0">
+                        <a:solidFill>
+                          <a:srgbClr val="C00000"/>
+                        </a:solidFill>
+                      </a:endParaRPr>
                     </a:p>
                   </a:txBody>
                   <a:tcPr/>
@@ -13358,28 +13463,6 @@
           <a:lstStyle/>
           <a:p>
             <a:endParaRPr lang="fr-FR"/>
-          </a:p>
-        </p:txBody>
-      </p:sp>
-      <p:sp>
-        <p:nvSpPr>
-          <p:cNvPr id="3" name="Content Placeholder 2"/>
-          <p:cNvSpPr>
-            <a:spLocks noGrp="1"/>
-          </p:cNvSpPr>
-          <p:nvPr>
-            <p:ph idx="1"/>
-          </p:nvPr>
-        </p:nvSpPr>
-        <p:spPr/>
-        <p:txBody>
-          <a:bodyPr/>
-          <a:lstStyle/>
-          <a:p>
-            <a:endParaRPr dirty="0"/>
-          </a:p>
-          <a:p>
-            <a:endParaRPr dirty="0"/>
           </a:p>
         </p:txBody>
       </p:sp>
@@ -13721,14 +13804,14 @@
           <p:nvPr>
             <p:extLst>
               <p:ext uri="{D42A27DB-BD31-4B8C-83A1-F6EECF244321}">
-                <p14:modId xmlns:p14="http://schemas.microsoft.com/office/powerpoint/2010/main" val="2190788208"/>
+                <p14:modId xmlns:p14="http://schemas.microsoft.com/office/powerpoint/2010/main" val="3924569274"/>
               </p:ext>
             </p:extLst>
           </p:nvPr>
         </p:nvGraphicFramePr>
         <p:xfrm>
           <a:off x="0" y="2180210"/>
-          <a:ext cx="9143999" cy="3205480"/>
+          <a:ext cx="9143999" cy="3388360"/>
         </p:xfrm>
         <a:graphic>
           <a:graphicData uri="http://schemas.openxmlformats.org/drawingml/2006/table">
@@ -13778,7 +13861,7 @@
                       <a:pPr algn="ctr"/>
                       <a:r>
                         <a:rPr lang="fr-CH" dirty="0"/>
-                        <a:t>Avant</a:t>
+                        <a:t>Statique</a:t>
                       </a:r>
                       <a:endParaRPr lang="fr-FR" dirty="0"/>
                     </a:p>
@@ -13793,7 +13876,7 @@
                       <a:pPr algn="ctr"/>
                       <a:r>
                         <a:rPr lang="fr-CH" dirty="0"/>
-                        <a:t>Après</a:t>
+                        <a:t>Dynamique</a:t>
                       </a:r>
                       <a:endParaRPr lang="fr-FR" dirty="0"/>
                     </a:p>
@@ -13850,18 +13933,26 @@
                         <a:defRPr/>
                       </a:pPr>
                       <a:r>
-                        <a:rPr lang="fr-CH" sz="1200" dirty="0"/>
+                        <a:rPr lang="fr-CH" sz="1200" dirty="0">
+                          <a:solidFill>
+                            <a:srgbClr val="C00000"/>
+                          </a:solidFill>
+                        </a:rPr>
                         <a:t>Evolution et montée de version plus difficile </a:t>
                       </a:r>
                       <a:r>
                         <a:rPr lang="fr-CH" sz="1200" b="1" dirty="0">
                           <a:solidFill>
-                            <a:srgbClr val="FF0000"/>
+                            <a:srgbClr val="C00000"/>
                           </a:solidFill>
                         </a:rPr>
                         <a:t>(-)</a:t>
                       </a:r>
-                      <a:endParaRPr lang="fr-FR" sz="1200" dirty="0"/>
+                      <a:endParaRPr lang="fr-FR" sz="1200" dirty="0">
+                        <a:solidFill>
+                          <a:srgbClr val="C00000"/>
+                        </a:solidFill>
+                      </a:endParaRPr>
                     </a:p>
                   </a:txBody>
                   <a:tcPr/>
@@ -13890,6 +13981,9 @@
                       </a:pPr>
                       <a:r>
                         <a:rPr lang="fr-FR" sz="1200" b="0" i="0" dirty="0">
+                          <a:solidFill>
+                            <a:srgbClr val="C00000"/>
+                          </a:solidFill>
                           <a:effectLst/>
                           <a:latin typeface="-apple-system"/>
                         </a:rPr>
@@ -13897,6 +13991,9 @@
                       </a:r>
                       <a:r>
                         <a:rPr lang="fr-FR" sz="1200" b="0" i="0" dirty="0" err="1">
+                          <a:solidFill>
+                            <a:srgbClr val="C00000"/>
+                          </a:solidFill>
                           <a:effectLst/>
                           <a:latin typeface="-apple-system"/>
                         </a:rPr>
@@ -13904,6 +14001,9 @@
                       </a:r>
                       <a:r>
                         <a:rPr lang="fr-FR" sz="1200" b="0" i="0" dirty="0">
+                          <a:solidFill>
+                            <a:srgbClr val="C00000"/>
+                          </a:solidFill>
                           <a:effectLst/>
                           <a:latin typeface="-apple-system"/>
                         </a:rPr>
@@ -13912,12 +14012,16 @@
                       <a:r>
                         <a:rPr lang="fr-CH" sz="1200" b="1" dirty="0">
                           <a:solidFill>
-                            <a:srgbClr val="00B050"/>
+                            <a:srgbClr val="C00000"/>
                           </a:solidFill>
                         </a:rPr>
                         <a:t>(+)</a:t>
                       </a:r>
-                      <a:endParaRPr lang="fr-FR" sz="1200" dirty="0"/>
+                      <a:endParaRPr lang="fr-FR" sz="1200" dirty="0">
+                        <a:solidFill>
+                          <a:srgbClr val="C00000"/>
+                        </a:solidFill>
+                      </a:endParaRPr>
                     </a:p>
                   </a:txBody>
                   <a:tcPr/>
@@ -14083,6 +14187,9 @@
                       </a:pPr>
                       <a:r>
                         <a:rPr lang="fr-CH" sz="1200" b="0" i="0" dirty="0">
+                          <a:solidFill>
+                            <a:srgbClr val="FFC000"/>
+                          </a:solidFill>
                           <a:effectLst/>
                           <a:latin typeface="-apple-system"/>
                         </a:rPr>
@@ -14090,6 +14197,9 @@
                       </a:r>
                       <a:r>
                         <a:rPr lang="fr-FR" sz="1200" b="0" i="0" dirty="0">
+                          <a:solidFill>
+                            <a:srgbClr val="FFC000"/>
+                          </a:solidFill>
                           <a:effectLst/>
                           <a:latin typeface="-apple-system"/>
                         </a:rPr>
@@ -14098,12 +14208,16 @@
                       <a:r>
                         <a:rPr lang="fr-CH" sz="1200" b="1" dirty="0">
                           <a:solidFill>
-                            <a:srgbClr val="FF0000"/>
+                            <a:srgbClr val="FFC000"/>
                           </a:solidFill>
                         </a:rPr>
                         <a:t>(-)</a:t>
                       </a:r>
-                      <a:endParaRPr lang="fr-FR" sz="1200" dirty="0"/>
+                      <a:endParaRPr lang="fr-FR" sz="1200" dirty="0">
+                        <a:solidFill>
+                          <a:srgbClr val="FFC000"/>
+                        </a:solidFill>
+                      </a:endParaRPr>
                     </a:p>
                   </a:txBody>
                   <a:tcPr/>
@@ -14132,6 +14246,9 @@
                       </a:pPr>
                       <a:r>
                         <a:rPr lang="fr-FR" sz="1200" b="0" i="0" dirty="0">
+                          <a:solidFill>
+                            <a:srgbClr val="FFC000"/>
+                          </a:solidFill>
                           <a:effectLst/>
                           <a:latin typeface="-apple-system"/>
                         </a:rPr>
@@ -14139,6 +14256,9 @@
                       </a:r>
                       <a:r>
                         <a:rPr lang="fr-FR" sz="1200" b="0" i="0" dirty="0" err="1">
+                          <a:solidFill>
+                            <a:srgbClr val="FFC000"/>
+                          </a:solidFill>
                           <a:effectLst/>
                           <a:latin typeface="-apple-system"/>
                         </a:rPr>
@@ -14146,24 +14266,35 @@
                       </a:r>
                       <a:r>
                         <a:rPr lang="fr-FR" sz="1200" b="0" i="0" dirty="0">
+                          <a:solidFill>
+                            <a:srgbClr val="FFC000"/>
+                          </a:solidFill>
                           <a:effectLst/>
                           <a:latin typeface="-apple-system"/>
                         </a:rPr>
                         <a:t> échoue, l'architecture microservices garantit que cela n’affecte pas l'ensemble de l’application</a:t>
                       </a:r>
                       <a:r>
-                        <a:rPr lang="fr-FR" sz="1200" dirty="0"/>
+                        <a:rPr lang="fr-FR" sz="1200" dirty="0">
+                          <a:solidFill>
+                            <a:srgbClr val="FFC000"/>
+                          </a:solidFill>
+                        </a:rPr>
                         <a:t> </a:t>
                       </a:r>
                       <a:r>
                         <a:rPr lang="fr-CH" sz="1200" b="1" dirty="0">
                           <a:solidFill>
-                            <a:srgbClr val="00B050"/>
+                            <a:srgbClr val="FFC000"/>
                           </a:solidFill>
                         </a:rPr>
                         <a:t>(+)</a:t>
                       </a:r>
-                      <a:endParaRPr lang="fr-FR" sz="1200" dirty="0"/>
+                      <a:endParaRPr lang="fr-FR" sz="1200" dirty="0">
+                        <a:solidFill>
+                          <a:srgbClr val="FFC000"/>
+                        </a:solidFill>
+                      </a:endParaRPr>
                     </a:p>
                   </a:txBody>
                   <a:tcPr/>
@@ -14337,6 +14468,41 @@
                         </a:rPr>
                         <a:t>(+)</a:t>
                       </a:r>
+                    </a:p>
+                    <a:p>
+                      <a:pPr marL="285750" marR="0" lvl="0" indent="-285750" algn="l" defTabSz="457200" rtl="0" eaLnBrk="1" fontAlgn="auto" latinLnBrk="0" hangingPunct="1">
+                        <a:lnSpc>
+                          <a:spcPct val="100000"/>
+                        </a:lnSpc>
+                        <a:spcBef>
+                          <a:spcPts val="0"/>
+                        </a:spcBef>
+                        <a:spcAft>
+                          <a:spcPts val="0"/>
+                        </a:spcAft>
+                        <a:buClrTx/>
+                        <a:buSzTx/>
+                        <a:buFont typeface="Arial" panose="020B0604020202020204" pitchFamily="34" charset="0"/>
+                        <a:buChar char="•"/>
+                        <a:tabLst/>
+                        <a:defRPr/>
+                      </a:pPr>
+                      <a:r>
+                        <a:rPr lang="fr-CH" sz="1200" b="1" dirty="0">
+                          <a:solidFill>
+                            <a:srgbClr val="00B050"/>
+                          </a:solidFill>
+                        </a:rPr>
+                        <a:t>Transfert de charge entre dev et </a:t>
+                      </a:r>
+                      <a:r>
+                        <a:rPr lang="fr-CH" sz="1200" b="1" dirty="0" err="1">
+                          <a:solidFill>
+                            <a:srgbClr val="00B050"/>
+                          </a:solidFill>
+                        </a:rPr>
+                        <a:t>ops</a:t>
+                      </a:r>
                       <a:endParaRPr lang="fr-FR" sz="1200" dirty="0"/>
                     </a:p>
                   </a:txBody>
@@ -14496,6 +14662,49 @@
                           </a:solidFill>
                         </a:rPr>
                         <a:t>(+)</a:t>
+                      </a:r>
+                    </a:p>
+                    <a:p>
+                      <a:pPr marL="285750" marR="0" lvl="0" indent="-285750" algn="l" defTabSz="457200" rtl="0" eaLnBrk="1" fontAlgn="auto" latinLnBrk="0" hangingPunct="1">
+                        <a:lnSpc>
+                          <a:spcPct val="100000"/>
+                        </a:lnSpc>
+                        <a:spcBef>
+                          <a:spcPts val="0"/>
+                        </a:spcBef>
+                        <a:spcAft>
+                          <a:spcPts val="0"/>
+                        </a:spcAft>
+                        <a:buClrTx/>
+                        <a:buSzTx/>
+                        <a:buFont typeface="Arial" panose="020B0604020202020204" pitchFamily="34" charset="0"/>
+                        <a:buChar char="•"/>
+                        <a:tabLst/>
+                        <a:defRPr/>
+                      </a:pPr>
+                      <a:r>
+                        <a:rPr lang="fr-CH" sz="1200" b="1" dirty="0" err="1">
+                          <a:solidFill>
+                            <a:srgbClr val="00B050"/>
+                          </a:solidFill>
+                        </a:rPr>
+                        <a:t>Accer</a:t>
+                      </a:r>
+                      <a:r>
+                        <a:rPr lang="fr-CH" sz="1200" b="1" dirty="0">
+                          <a:solidFill>
+                            <a:srgbClr val="00B050"/>
+                          </a:solidFill>
+                        </a:rPr>
+                        <a:t> sur l’axe live du </a:t>
+                      </a:r>
+                      <a:r>
+                        <a:rPr lang="fr-CH" sz="1200" b="1" dirty="0" err="1">
+                          <a:solidFill>
+                            <a:srgbClr val="00B050"/>
+                          </a:solidFill>
+                        </a:rPr>
+                        <a:t>deploy</a:t>
                       </a:r>
                       <a:endParaRPr lang="fr-CH" sz="1200" b="1" dirty="0">
                         <a:solidFill>

</xml_diff>